<commit_message>
Version 1.3 en cours (composer, finition du système view)
- Installation de composer et de son autoloader, d'imagick, de dump (en --dev) et dompdf
- Classe Spell refaite pour correspondre au système de génération des visuals.
- Débogages de la dernière maj
- Refonte du système de droit -> plus simple pour créer un nouveau droit maintenant
- Préparation pour la refonte du système de fichier (notamment l'ajout d'image personnalisé pour les PNJ) avec création de thumbailts.
</commit_message>
<xml_diff>
--- a/medias/help/fiche_perso.pptx
+++ b/medias/help/fiche_perso.pptx
@@ -244,7 +244,7 @@
           <a:p>
             <a:fld id="{73F300BA-884B-492F-9DA2-6FBA3E12B197}" type="datetimeFigureOut">
               <a:rPr lang="fr-FR" smtClean="0"/>
-              <a:t>08/12/2022</a:t>
+              <a:t>28/02/2023</a:t>
             </a:fld>
             <a:endParaRPr lang="fr-FR"/>
           </a:p>
@@ -414,7 +414,7 @@
           <a:p>
             <a:fld id="{73F300BA-884B-492F-9DA2-6FBA3E12B197}" type="datetimeFigureOut">
               <a:rPr lang="fr-FR" smtClean="0"/>
-              <a:t>08/12/2022</a:t>
+              <a:t>28/02/2023</a:t>
             </a:fld>
             <a:endParaRPr lang="fr-FR"/>
           </a:p>
@@ -594,7 +594,7 @@
           <a:p>
             <a:fld id="{73F300BA-884B-492F-9DA2-6FBA3E12B197}" type="datetimeFigureOut">
               <a:rPr lang="fr-FR" smtClean="0"/>
-              <a:t>08/12/2022</a:t>
+              <a:t>28/02/2023</a:t>
             </a:fld>
             <a:endParaRPr lang="fr-FR"/>
           </a:p>
@@ -764,7 +764,7 @@
           <a:p>
             <a:fld id="{73F300BA-884B-492F-9DA2-6FBA3E12B197}" type="datetimeFigureOut">
               <a:rPr lang="fr-FR" smtClean="0"/>
-              <a:t>08/12/2022</a:t>
+              <a:t>28/02/2023</a:t>
             </a:fld>
             <a:endParaRPr lang="fr-FR"/>
           </a:p>
@@ -1008,7 +1008,7 @@
           <a:p>
             <a:fld id="{73F300BA-884B-492F-9DA2-6FBA3E12B197}" type="datetimeFigureOut">
               <a:rPr lang="fr-FR" smtClean="0"/>
-              <a:t>08/12/2022</a:t>
+              <a:t>28/02/2023</a:t>
             </a:fld>
             <a:endParaRPr lang="fr-FR"/>
           </a:p>
@@ -1240,7 +1240,7 @@
           <a:p>
             <a:fld id="{73F300BA-884B-492F-9DA2-6FBA3E12B197}" type="datetimeFigureOut">
               <a:rPr lang="fr-FR" smtClean="0"/>
-              <a:t>08/12/2022</a:t>
+              <a:t>28/02/2023</a:t>
             </a:fld>
             <a:endParaRPr lang="fr-FR"/>
           </a:p>
@@ -1607,7 +1607,7 @@
           <a:p>
             <a:fld id="{73F300BA-884B-492F-9DA2-6FBA3E12B197}" type="datetimeFigureOut">
               <a:rPr lang="fr-FR" smtClean="0"/>
-              <a:t>08/12/2022</a:t>
+              <a:t>28/02/2023</a:t>
             </a:fld>
             <a:endParaRPr lang="fr-FR"/>
           </a:p>
@@ -1725,7 +1725,7 @@
           <a:p>
             <a:fld id="{73F300BA-884B-492F-9DA2-6FBA3E12B197}" type="datetimeFigureOut">
               <a:rPr lang="fr-FR" smtClean="0"/>
-              <a:t>08/12/2022</a:t>
+              <a:t>28/02/2023</a:t>
             </a:fld>
             <a:endParaRPr lang="fr-FR"/>
           </a:p>
@@ -1820,7 +1820,7 @@
           <a:p>
             <a:fld id="{73F300BA-884B-492F-9DA2-6FBA3E12B197}" type="datetimeFigureOut">
               <a:rPr lang="fr-FR" smtClean="0"/>
-              <a:t>08/12/2022</a:t>
+              <a:t>28/02/2023</a:t>
             </a:fld>
             <a:endParaRPr lang="fr-FR"/>
           </a:p>
@@ -2097,7 +2097,7 @@
           <a:p>
             <a:fld id="{73F300BA-884B-492F-9DA2-6FBA3E12B197}" type="datetimeFigureOut">
               <a:rPr lang="fr-FR" smtClean="0"/>
-              <a:t>08/12/2022</a:t>
+              <a:t>28/02/2023</a:t>
             </a:fld>
             <a:endParaRPr lang="fr-FR"/>
           </a:p>
@@ -2354,7 +2354,7 @@
           <a:p>
             <a:fld id="{73F300BA-884B-492F-9DA2-6FBA3E12B197}" type="datetimeFigureOut">
               <a:rPr lang="fr-FR" smtClean="0"/>
-              <a:t>08/12/2022</a:t>
+              <a:t>28/02/2023</a:t>
             </a:fld>
             <a:endParaRPr lang="fr-FR"/>
           </a:p>
@@ -2567,7 +2567,7 @@
           <a:p>
             <a:fld id="{73F300BA-884B-492F-9DA2-6FBA3E12B197}" type="datetimeFigureOut">
               <a:rPr lang="fr-FR" smtClean="0"/>
-              <a:t>08/12/2022</a:t>
+              <a:t>28/02/2023</a:t>
             </a:fld>
             <a:endParaRPr lang="fr-FR"/>
           </a:p>
@@ -8566,7 +8566,7 @@
         </p:nvGrpSpPr>
         <p:grpSpPr>
           <a:xfrm>
-            <a:off x="1883592" y="4423257"/>
+            <a:off x="1882594" y="4423257"/>
             <a:ext cx="1882453" cy="7521925"/>
             <a:chOff x="1767842" y="4365382"/>
             <a:chExt cx="1882453" cy="7521925"/>
@@ -13703,10 +13703,10 @@
             </p:nvGrpSpPr>
             <p:grpSpPr>
               <a:xfrm>
-                <a:off x="91170" y="5495389"/>
-                <a:ext cx="2049500" cy="754225"/>
-                <a:chOff x="91170" y="5507581"/>
-                <a:chExt cx="2049500" cy="754225"/>
+                <a:off x="74571" y="5495389"/>
+                <a:ext cx="2066099" cy="754225"/>
+                <a:chOff x="74571" y="5507581"/>
+                <a:chExt cx="2066099" cy="754225"/>
               </a:xfrm>
             </p:grpSpPr>
             <p:grpSp>
@@ -14293,8 +14293,8 @@
               </p:nvSpPr>
               <p:spPr>
                 <a:xfrm>
-                  <a:off x="434226" y="5860714"/>
-                  <a:ext cx="287258" cy="215444"/>
+                  <a:off x="74571" y="5857067"/>
+                  <a:ext cx="676788" cy="215444"/>
                 </a:xfrm>
                 <a:prstGeom prst="rect">
                   <a:avLst/>
@@ -14315,7 +14315,7 @@
                         </a:schemeClr>
                       </a:solidFill>
                     </a:rPr>
-                    <a:t>10</a:t>
+                    <a:t>[Niveau / 2]</a:t>
                   </a:r>
                 </a:p>
               </p:txBody>
@@ -14334,8 +14334,8 @@
               </p:nvSpPr>
               <p:spPr>
                 <a:xfrm>
-                  <a:off x="1406946" y="5847472"/>
-                  <a:ext cx="676788" cy="215444"/>
+                  <a:off x="1292684" y="5853096"/>
+                  <a:ext cx="824265" cy="215444"/>
                 </a:xfrm>
                 <a:prstGeom prst="rect">
                   <a:avLst/>
@@ -14356,7 +14356,7 @@
                         </a:schemeClr>
                       </a:solidFill>
                     </a:rPr>
-                    <a:t>[Niveau / 2]</a:t>
+                    <a:t>[Niveau / 2 +5]</a:t>
                   </a:r>
                 </a:p>
               </p:txBody>
@@ -14635,10 +14635,10 @@
             </p:nvGrpSpPr>
             <p:grpSpPr>
               <a:xfrm>
-                <a:off x="83178" y="6505219"/>
-                <a:ext cx="2062885" cy="754225"/>
-                <a:chOff x="77785" y="5507581"/>
-                <a:chExt cx="2062885" cy="754225"/>
+                <a:off x="78821" y="6505219"/>
+                <a:ext cx="2067242" cy="754225"/>
+                <a:chOff x="73428" y="5507581"/>
+                <a:chExt cx="2067242" cy="754225"/>
               </a:xfrm>
             </p:grpSpPr>
             <p:grpSp>
@@ -15222,8 +15222,8 @@
               </p:nvSpPr>
               <p:spPr>
                 <a:xfrm>
-                  <a:off x="442260" y="5865579"/>
-                  <a:ext cx="287258" cy="215444"/>
+                  <a:off x="73428" y="5861277"/>
+                  <a:ext cx="676788" cy="215444"/>
                 </a:xfrm>
                 <a:prstGeom prst="rect">
                   <a:avLst/>
@@ -15242,7 +15242,7 @@
                         <a:srgbClr val="B381D9"/>
                       </a:solidFill>
                     </a:rPr>
-                    <a:t>10</a:t>
+                    <a:t>[Niveau / 2]</a:t>
                   </a:r>
                 </a:p>
               </p:txBody>
@@ -15261,8 +15261,8 @@
               </p:nvSpPr>
               <p:spPr>
                 <a:xfrm>
-                  <a:off x="1406642" y="5851192"/>
-                  <a:ext cx="676788" cy="215444"/>
+                  <a:off x="1300324" y="5851724"/>
+                  <a:ext cx="824265" cy="215444"/>
                 </a:xfrm>
                 <a:prstGeom prst="rect">
                   <a:avLst/>
@@ -15281,7 +15281,7 @@
                         <a:srgbClr val="B381D9"/>
                       </a:solidFill>
                     </a:rPr>
-                    <a:t>[Niveau / 2]</a:t>
+                    <a:t>[Niveau / 2 +5]</a:t>
                   </a:r>
                 </a:p>
               </p:txBody>
@@ -15424,10 +15424,10 @@
           </p:nvGrpSpPr>
           <p:grpSpPr>
             <a:xfrm>
-              <a:off x="72573" y="7185420"/>
-              <a:ext cx="2068097" cy="1067420"/>
-              <a:chOff x="72573" y="7185420"/>
-              <a:chExt cx="2068097" cy="1067420"/>
+              <a:off x="66255" y="7185420"/>
+              <a:ext cx="2074415" cy="1067420"/>
+              <a:chOff x="66255" y="7185420"/>
+              <a:chExt cx="2074415" cy="1067420"/>
             </a:xfrm>
           </p:grpSpPr>
           <p:sp>
@@ -15554,10 +15554,10 @@
             </p:nvGrpSpPr>
             <p:grpSpPr>
               <a:xfrm>
-                <a:off x="72573" y="7495461"/>
-                <a:ext cx="2068097" cy="757379"/>
-                <a:chOff x="72573" y="5504427"/>
-                <a:chExt cx="2068097" cy="757379"/>
+                <a:off x="66255" y="7495461"/>
+                <a:ext cx="2074415" cy="757379"/>
+                <a:chOff x="66255" y="5504427"/>
+                <a:chExt cx="2074415" cy="757379"/>
               </a:xfrm>
             </p:grpSpPr>
             <p:grpSp>
@@ -16141,8 +16141,8 @@
               </p:nvSpPr>
               <p:spPr>
                 <a:xfrm>
-                  <a:off x="428205" y="5865860"/>
-                  <a:ext cx="287258" cy="215444"/>
+                  <a:off x="66255" y="5865860"/>
+                  <a:ext cx="676788" cy="215444"/>
                 </a:xfrm>
                 <a:prstGeom prst="rect">
                   <a:avLst/>
@@ -16161,7 +16161,7 @@
                         <a:srgbClr val="B49F86"/>
                       </a:solidFill>
                     </a:rPr>
-                    <a:t>10</a:t>
+                    <a:t>[Niveau / 2]</a:t>
                   </a:r>
                 </a:p>
               </p:txBody>
@@ -16180,8 +16180,8 @@
               </p:nvSpPr>
               <p:spPr>
                 <a:xfrm>
-                  <a:off x="1413873" y="5851447"/>
-                  <a:ext cx="676788" cy="215444"/>
+                  <a:off x="1280523" y="5851447"/>
+                  <a:ext cx="801823" cy="215444"/>
                 </a:xfrm>
                 <a:prstGeom prst="rect">
                   <a:avLst/>
@@ -16200,7 +16200,7 @@
                         <a:srgbClr val="B49F86"/>
                       </a:solidFill>
                     </a:rPr>
-                    <a:t>[Niveau / 2]</a:t>
+                    <a:t>[Niveau / 2 +5]</a:t>
                   </a:r>
                 </a:p>
               </p:txBody>
@@ -17061,8 +17061,8 @@
               </p:nvSpPr>
               <p:spPr>
                 <a:xfrm>
-                  <a:off x="438393" y="5856360"/>
-                  <a:ext cx="287258" cy="215444"/>
+                  <a:off x="68823" y="5856360"/>
+                  <a:ext cx="676788" cy="215444"/>
                 </a:xfrm>
                 <a:prstGeom prst="rect">
                   <a:avLst/>
@@ -17081,7 +17081,7 @@
                         <a:srgbClr val="ED7049"/>
                       </a:solidFill>
                     </a:rPr>
-                    <a:t>10</a:t>
+                    <a:t>[Niveau / 2]</a:t>
                   </a:r>
                 </a:p>
               </p:txBody>
@@ -17100,8 +17100,8 @@
               </p:nvSpPr>
               <p:spPr>
                 <a:xfrm>
-                  <a:off x="1397797" y="5851282"/>
-                  <a:ext cx="699230" cy="215444"/>
+                  <a:off x="1275877" y="5851282"/>
+                  <a:ext cx="801823" cy="215444"/>
                 </a:xfrm>
                 <a:prstGeom prst="rect">
                   <a:avLst/>
@@ -17120,7 +17120,7 @@
                         <a:srgbClr val="ED7049"/>
                       </a:solidFill>
                     </a:rPr>
-                    <a:t>[Niveau / 2]</a:t>
+                    <a:t>[Niveau / 2 +5]</a:t>
                   </a:r>
                 </a:p>
               </p:txBody>
@@ -17264,10 +17264,10 @@
           </p:nvGrpSpPr>
           <p:grpSpPr>
             <a:xfrm>
-              <a:off x="66383" y="9224764"/>
-              <a:ext cx="2069434" cy="1057489"/>
-              <a:chOff x="66383" y="9224764"/>
-              <a:chExt cx="2069434" cy="1057489"/>
+              <a:off x="64717" y="9224764"/>
+              <a:ext cx="2071100" cy="1057489"/>
+              <a:chOff x="64717" y="9224764"/>
+              <a:chExt cx="2071100" cy="1057489"/>
             </a:xfrm>
           </p:grpSpPr>
           <p:sp>
@@ -17394,10 +17394,10 @@
             </p:nvGrpSpPr>
             <p:grpSpPr>
               <a:xfrm>
-                <a:off x="66383" y="9528028"/>
-                <a:ext cx="2069434" cy="754225"/>
-                <a:chOff x="71236" y="5507581"/>
-                <a:chExt cx="2069434" cy="754225"/>
+                <a:off x="64717" y="9528028"/>
+                <a:ext cx="2071100" cy="754225"/>
+                <a:chOff x="69570" y="5507581"/>
+                <a:chExt cx="2071100" cy="754225"/>
               </a:xfrm>
             </p:grpSpPr>
             <p:grpSp>
@@ -18007,8 +18007,8 @@
               </p:nvSpPr>
               <p:spPr>
                 <a:xfrm>
-                  <a:off x="442950" y="5860927"/>
-                  <a:ext cx="287258" cy="215444"/>
+                  <a:off x="69570" y="5860927"/>
+                  <a:ext cx="676788" cy="215444"/>
                 </a:xfrm>
                 <a:prstGeom prst="rect">
                   <a:avLst/>
@@ -18027,7 +18027,7 @@
                         <a:srgbClr val="76B54B"/>
                       </a:solidFill>
                     </a:rPr>
-                    <a:t>10</a:t>
+                    <a:t>[Niveau / 2]</a:t>
                   </a:r>
                 </a:p>
               </p:txBody>
@@ -18046,8 +18046,8 @@
               </p:nvSpPr>
               <p:spPr>
                 <a:xfrm>
-                  <a:off x="1412925" y="5833212"/>
-                  <a:ext cx="676788" cy="215444"/>
+                  <a:off x="1275765" y="5833212"/>
+                  <a:ext cx="801823" cy="215444"/>
                 </a:xfrm>
                 <a:prstGeom prst="rect">
                   <a:avLst/>
@@ -18066,7 +18066,7 @@
                         <a:srgbClr val="76B54B"/>
                       </a:solidFill>
                     </a:rPr>
-                    <a:t>[Niveau / 2]</a:t>
+                    <a:t>[Niveau / 2 +5]</a:t>
                   </a:r>
                 </a:p>
               </p:txBody>
@@ -18958,8 +18958,8 @@
               </p:nvSpPr>
               <p:spPr>
                 <a:xfrm>
-                  <a:off x="442950" y="5861571"/>
-                  <a:ext cx="287258" cy="215444"/>
+                  <a:off x="61950" y="5861571"/>
+                  <a:ext cx="676788" cy="215444"/>
                 </a:xfrm>
                 <a:prstGeom prst="rect">
                   <a:avLst/>
@@ -18975,13 +18975,10 @@
                   <a:r>
                     <a:rPr lang="fr-FR" sz="800" dirty="0">
                       <a:solidFill>
-                        <a:schemeClr val="accent1">
-                          <a:lumMod val="60000"/>
-                          <a:lumOff val="40000"/>
-                        </a:schemeClr>
+                        <a:srgbClr val="8FAADC"/>
                       </a:solidFill>
                     </a:rPr>
-                    <a:t>10</a:t>
+                    <a:t>[Niveau / 2]</a:t>
                   </a:r>
                 </a:p>
               </p:txBody>
@@ -19000,8 +18997,8 @@
               </p:nvSpPr>
               <p:spPr>
                 <a:xfrm>
-                  <a:off x="1774769" y="5862051"/>
-                  <a:ext cx="287258" cy="215444"/>
+                  <a:off x="1283279" y="5843001"/>
+                  <a:ext cx="801823" cy="215444"/>
                 </a:xfrm>
                 <a:prstGeom prst="rect">
                   <a:avLst/>
@@ -19017,13 +19014,10 @@
                   <a:r>
                     <a:rPr lang="fr-FR" sz="800" dirty="0">
                       <a:solidFill>
-                        <a:schemeClr val="accent1">
-                          <a:lumMod val="60000"/>
-                          <a:lumOff val="40000"/>
-                        </a:schemeClr>
+                        <a:srgbClr val="8FAADC"/>
                       </a:solidFill>
                     </a:rPr>
-                    <a:t>10</a:t>
+                    <a:t>[Niveau / 2 +5]</a:t>
                   </a:r>
                 </a:p>
               </p:txBody>
@@ -29335,15 +29329,18 @@
                 <a:effectLst/>
                 <a:latin typeface="Segoe UI" panose="020B0502040204020203" pitchFamily="34" charset="0"/>
               </a:rPr>
-              <a:t>β 1.1</a:t>
+              <a:t>β 1.</a:t>
             </a:r>
-            <a:endParaRPr lang="fr-FR" sz="1000" b="0" i="0" dirty="0">
-              <a:solidFill>
-                <a:srgbClr val="90A4AE"/>
-              </a:solidFill>
-              <a:effectLst/>
-              <a:latin typeface="Segoe UI" panose="020B0502040204020203" pitchFamily="34" charset="0"/>
-            </a:endParaRPr>
+            <a:r>
+              <a:rPr lang="fr-FR" sz="1000" b="0" i="0" dirty="0">
+                <a:solidFill>
+                  <a:srgbClr val="90A4AE"/>
+                </a:solidFill>
+                <a:effectLst/>
+                <a:latin typeface="Segoe UI" panose="020B0502040204020203" pitchFamily="34" charset="0"/>
+              </a:rPr>
+              <a:t>3</a:t>
+            </a:r>
           </a:p>
           <a:p>
             <a:pPr algn="ctr"/>
@@ -29354,7 +29351,7 @@
                 </a:solidFill>
                 <a:latin typeface="Segoe UI" panose="020B0502040204020203" pitchFamily="34" charset="0"/>
               </a:rPr>
-              <a:t>Version fiche personnage 1.0</a:t>
+              <a:t>Version fiche personnage 1.1</a:t>
             </a:r>
             <a:endParaRPr lang="fr-FR" sz="1000" dirty="0"/>
           </a:p>
@@ -40696,15 +40693,18 @@
                 <a:effectLst/>
                 <a:latin typeface="Segoe UI" panose="020B0502040204020203" pitchFamily="34" charset="0"/>
               </a:rPr>
-              <a:t>β 1.1</a:t>
+              <a:t>β 1.</a:t>
             </a:r>
-            <a:endParaRPr lang="fr-FR" sz="1000" b="0" i="0" dirty="0">
-              <a:solidFill>
-                <a:srgbClr val="90A4AE"/>
-              </a:solidFill>
-              <a:effectLst/>
-              <a:latin typeface="Segoe UI" panose="020B0502040204020203" pitchFamily="34" charset="0"/>
-            </a:endParaRPr>
+            <a:r>
+              <a:rPr lang="fr-FR" sz="1000" b="0" i="0" dirty="0">
+                <a:solidFill>
+                  <a:srgbClr val="90A4AE"/>
+                </a:solidFill>
+                <a:effectLst/>
+                <a:latin typeface="Segoe UI" panose="020B0502040204020203" pitchFamily="34" charset="0"/>
+              </a:rPr>
+              <a:t>3</a:t>
+            </a:r>
           </a:p>
           <a:p>
             <a:pPr algn="ctr"/>
@@ -40715,7 +40715,7 @@
                 </a:solidFill>
                 <a:latin typeface="Segoe UI" panose="020B0502040204020203" pitchFamily="34" charset="0"/>
               </a:rPr>
-              <a:t>Version fiche personnage 1.0</a:t>
+              <a:t>Version fiche personnage 1.1</a:t>
             </a:r>
             <a:endParaRPr lang="fr-FR" sz="1000" dirty="0"/>
           </a:p>

</xml_diff>

<commit_message>
Ajout des données progressif pour les tableaux
</commit_message>
<xml_diff>
--- a/medias/help/fiche_perso.pptx
+++ b/medias/help/fiche_perso.pptx
@@ -244,7 +244,7 @@
           <a:p>
             <a:fld id="{73F300BA-884B-492F-9DA2-6FBA3E12B197}" type="datetimeFigureOut">
               <a:rPr lang="fr-FR" smtClean="0"/>
-              <a:t>18/04/2023</a:t>
+              <a:t>26/04/2023</a:t>
             </a:fld>
             <a:endParaRPr lang="fr-FR"/>
           </a:p>
@@ -414,7 +414,7 @@
           <a:p>
             <a:fld id="{73F300BA-884B-492F-9DA2-6FBA3E12B197}" type="datetimeFigureOut">
               <a:rPr lang="fr-FR" smtClean="0"/>
-              <a:t>18/04/2023</a:t>
+              <a:t>26/04/2023</a:t>
             </a:fld>
             <a:endParaRPr lang="fr-FR"/>
           </a:p>
@@ -594,7 +594,7 @@
           <a:p>
             <a:fld id="{73F300BA-884B-492F-9DA2-6FBA3E12B197}" type="datetimeFigureOut">
               <a:rPr lang="fr-FR" smtClean="0"/>
-              <a:t>18/04/2023</a:t>
+              <a:t>26/04/2023</a:t>
             </a:fld>
             <a:endParaRPr lang="fr-FR"/>
           </a:p>
@@ -764,7 +764,7 @@
           <a:p>
             <a:fld id="{73F300BA-884B-492F-9DA2-6FBA3E12B197}" type="datetimeFigureOut">
               <a:rPr lang="fr-FR" smtClean="0"/>
-              <a:t>18/04/2023</a:t>
+              <a:t>26/04/2023</a:t>
             </a:fld>
             <a:endParaRPr lang="fr-FR"/>
           </a:p>
@@ -1008,7 +1008,7 @@
           <a:p>
             <a:fld id="{73F300BA-884B-492F-9DA2-6FBA3E12B197}" type="datetimeFigureOut">
               <a:rPr lang="fr-FR" smtClean="0"/>
-              <a:t>18/04/2023</a:t>
+              <a:t>26/04/2023</a:t>
             </a:fld>
             <a:endParaRPr lang="fr-FR"/>
           </a:p>
@@ -1240,7 +1240,7 @@
           <a:p>
             <a:fld id="{73F300BA-884B-492F-9DA2-6FBA3E12B197}" type="datetimeFigureOut">
               <a:rPr lang="fr-FR" smtClean="0"/>
-              <a:t>18/04/2023</a:t>
+              <a:t>26/04/2023</a:t>
             </a:fld>
             <a:endParaRPr lang="fr-FR"/>
           </a:p>
@@ -1607,7 +1607,7 @@
           <a:p>
             <a:fld id="{73F300BA-884B-492F-9DA2-6FBA3E12B197}" type="datetimeFigureOut">
               <a:rPr lang="fr-FR" smtClean="0"/>
-              <a:t>18/04/2023</a:t>
+              <a:t>26/04/2023</a:t>
             </a:fld>
             <a:endParaRPr lang="fr-FR"/>
           </a:p>
@@ -1725,7 +1725,7 @@
           <a:p>
             <a:fld id="{73F300BA-884B-492F-9DA2-6FBA3E12B197}" type="datetimeFigureOut">
               <a:rPr lang="fr-FR" smtClean="0"/>
-              <a:t>18/04/2023</a:t>
+              <a:t>26/04/2023</a:t>
             </a:fld>
             <a:endParaRPr lang="fr-FR"/>
           </a:p>
@@ -1820,7 +1820,7 @@
           <a:p>
             <a:fld id="{73F300BA-884B-492F-9DA2-6FBA3E12B197}" type="datetimeFigureOut">
               <a:rPr lang="fr-FR" smtClean="0"/>
-              <a:t>18/04/2023</a:t>
+              <a:t>26/04/2023</a:t>
             </a:fld>
             <a:endParaRPr lang="fr-FR"/>
           </a:p>
@@ -2097,7 +2097,7 @@
           <a:p>
             <a:fld id="{73F300BA-884B-492F-9DA2-6FBA3E12B197}" type="datetimeFigureOut">
               <a:rPr lang="fr-FR" smtClean="0"/>
-              <a:t>18/04/2023</a:t>
+              <a:t>26/04/2023</a:t>
             </a:fld>
             <a:endParaRPr lang="fr-FR"/>
           </a:p>
@@ -2354,7 +2354,7 @@
           <a:p>
             <a:fld id="{73F300BA-884B-492F-9DA2-6FBA3E12B197}" type="datetimeFigureOut">
               <a:rPr lang="fr-FR" smtClean="0"/>
-              <a:t>18/04/2023</a:t>
+              <a:t>26/04/2023</a:t>
             </a:fld>
             <a:endParaRPr lang="fr-FR"/>
           </a:p>
@@ -2567,7 +2567,7 @@
           <a:p>
             <a:fld id="{73F300BA-884B-492F-9DA2-6FBA3E12B197}" type="datetimeFigureOut">
               <a:rPr lang="fr-FR" smtClean="0"/>
-              <a:t>18/04/2023</a:t>
+              <a:t>26/04/2023</a:t>
             </a:fld>
             <a:endParaRPr lang="fr-FR"/>
           </a:p>
@@ -39771,7 +39771,7 @@
                     <a:ea typeface="Calibri" panose="020F0502020204030204" pitchFamily="34" charset="0"/>
                     <a:cs typeface="Times New Roman" panose="02020603050405020304" pitchFamily="18" charset="0"/>
                   </a:rPr>
-                  <a:t>Capacités</a:t>
+                  <a:t>Aptitudes et Capacités</a:t>
                 </a:r>
               </a:p>
             </p:txBody>

</xml_diff>